<commit_message>
revert class 13 slides to my last version
</commit_message>
<xml_diff>
--- a/slides/13_naive_bayes.pptx
+++ b/slides/13_naive_bayes.pptx
@@ -253,7 +253,7 @@
           <a:p>
             <a:fld id="{DB92F479-4B50-F243-9713-1B12EC2B4BDB}" type="datetimeFigureOut">
               <a:rPr lang="en-US" smtClean="0"/>
-              <a:t>2/8/15</a:t>
+              <a:t>2/7/2015</a:t>
             </a:fld>
             <a:endParaRPr lang="en-US"/>
           </a:p>
@@ -2811,14 +2811,14 @@
             <a:noFill/>
           </a:ln>
           <a:extLst>
-            <a:ext uri="{909E8E84-426E-40dd-AFC4-6F175D3DCCD1}">
+            <a:ext uri="{909E8E84-426E-40DD-AFC4-6F175D3DCCD1}">
               <a14:hiddenFill xmlns:a14="http://schemas.microsoft.com/office/drawing/2010/main">
                 <a:solidFill>
                   <a:srgbClr val="FFFFFF"/>
                 </a:solidFill>
               </a14:hiddenFill>
             </a:ext>
-            <a:ext uri="{91240B29-F687-4f45-9708-019B960494DF}">
+            <a:ext uri="{91240B29-F687-4F45-9708-019B960494DF}">
               <a14:hiddenLine xmlns:a14="http://schemas.microsoft.com/office/drawing/2010/main" w="12700">
                 <a:solidFill>
                   <a:srgbClr val="000000"/>
@@ -2950,7 +2950,7 @@
   <p:clrMapOvr>
     <a:masterClrMapping/>
   </p:clrMapOvr>
-  <p:transition xmlns:p14="http://schemas.microsoft.com/office/powerpoint/2010/main"/>
+  <p:transition/>
 </p:sldLayout>
 </file>
 
@@ -2999,7 +2999,7 @@
           </a:ln>
           <a:effectLst/>
           <a:extLst>
-            <a:ext uri="{AF507438-7753-43e0-B8FC-AC1667EBCBE1}">
+            <a:ext uri="{AF507438-7753-43E0-B8FC-AC1667EBCBE1}">
               <a14:hiddenEffects xmlns:a14="http://schemas.microsoft.com/office/drawing/2010/main">
                 <a:effectLst>
                   <a:outerShdw blurRad="63500" dist="38099" dir="2700000" algn="ctr" rotWithShape="0">
@@ -3041,7 +3041,7 @@
           </a:ln>
           <a:effectLst/>
           <a:extLst>
-            <a:ext uri="{AF507438-7753-43e0-B8FC-AC1667EBCBE1}">
+            <a:ext uri="{AF507438-7753-43E0-B8FC-AC1667EBCBE1}">
               <a14:hiddenEffects xmlns:a14="http://schemas.microsoft.com/office/drawing/2010/main">
                 <a:effectLst>
                   <a:outerShdw blurRad="63500" dist="38099" dir="2700000" algn="ctr" rotWithShape="0">
@@ -3083,7 +3083,7 @@
           </a:ln>
           <a:effectLst/>
           <a:extLst>
-            <a:ext uri="{AF507438-7753-43e0-B8FC-AC1667EBCBE1}">
+            <a:ext uri="{AF507438-7753-43E0-B8FC-AC1667EBCBE1}">
               <a14:hiddenEffects xmlns:a14="http://schemas.microsoft.com/office/drawing/2010/main">
                 <a:effectLst>
                   <a:outerShdw blurRad="63500" dist="38099" dir="2700000" algn="ctr" rotWithShape="0">
@@ -3125,7 +3125,7 @@
           </a:ln>
           <a:effectLst/>
           <a:extLst>
-            <a:ext uri="{AF507438-7753-43e0-B8FC-AC1667EBCBE1}">
+            <a:ext uri="{AF507438-7753-43E0-B8FC-AC1667EBCBE1}">
               <a14:hiddenEffects xmlns:a14="http://schemas.microsoft.com/office/drawing/2010/main">
                 <a:effectLst>
                   <a:outerShdw blurRad="63500" dist="38099" dir="2700000" algn="ctr" rotWithShape="0">
@@ -3905,7 +3905,7 @@
   <p:clrMapOvr>
     <a:masterClrMapping/>
   </p:clrMapOvr>
-  <p:transition xmlns:p14="http://schemas.microsoft.com/office/powerpoint/2010/main"/>
+  <p:transition/>
 </p:sldLayout>
 </file>
 
@@ -3954,7 +3954,7 @@
           </a:ln>
           <a:effectLst/>
           <a:extLst>
-            <a:ext uri="{AF507438-7753-43e0-B8FC-AC1667EBCBE1}">
+            <a:ext uri="{AF507438-7753-43E0-B8FC-AC1667EBCBE1}">
               <a14:hiddenEffects xmlns:a14="http://schemas.microsoft.com/office/drawing/2010/main">
                 <a:effectLst>
                   <a:outerShdw blurRad="63500" dist="38099" dir="2700000" algn="ctr" rotWithShape="0">
@@ -3996,7 +3996,7 @@
           </a:ln>
           <a:effectLst/>
           <a:extLst>
-            <a:ext uri="{AF507438-7753-43e0-B8FC-AC1667EBCBE1}">
+            <a:ext uri="{AF507438-7753-43E0-B8FC-AC1667EBCBE1}">
               <a14:hiddenEffects xmlns:a14="http://schemas.microsoft.com/office/drawing/2010/main">
                 <a:effectLst>
                   <a:outerShdw blurRad="63500" dist="38099" dir="2700000" algn="ctr" rotWithShape="0">
@@ -4462,7 +4462,7 @@
   <p:clrMapOvr>
     <a:masterClrMapping/>
   </p:clrMapOvr>
-  <p:transition xmlns:p14="http://schemas.microsoft.com/office/powerpoint/2010/main"/>
+  <p:transition/>
 </p:sldLayout>
 </file>
 
@@ -4762,7 +4762,7 @@
   <p:clrMapOvr>
     <a:masterClrMapping/>
   </p:clrMapOvr>
-  <p:transition xmlns:p14="http://schemas.microsoft.com/office/powerpoint/2010/main"/>
+  <p:transition/>
 </p:sldLayout>
 </file>
 
@@ -4899,7 +4899,7 @@
   <p:clrMapOvr>
     <a:masterClrMapping/>
   </p:clrMapOvr>
-  <p:transition xmlns:p14="http://schemas.microsoft.com/office/powerpoint/2010/main"/>
+  <p:transition/>
 </p:sldLayout>
 </file>
 
@@ -5066,7 +5066,7 @@
   <p:clrMapOvr>
     <a:masterClrMapping/>
   </p:clrMapOvr>
-  <p:transition xmlns:p14="http://schemas.microsoft.com/office/powerpoint/2010/main"/>
+  <p:transition/>
 </p:sldLayout>
 </file>
 
@@ -5132,7 +5132,7 @@
   <p:clrMapOvr>
     <a:masterClrMapping/>
   </p:clrMapOvr>
-  <p:transition xmlns:p14="http://schemas.microsoft.com/office/powerpoint/2010/main"/>
+  <p:transition/>
 </p:sldLayout>
 </file>
 
@@ -5364,7 +5364,7 @@
   <p:clrMapOvr>
     <a:masterClrMapping/>
   </p:clrMapOvr>
-  <p:transition xmlns:p14="http://schemas.microsoft.com/office/powerpoint/2010/main"/>
+  <p:transition/>
 </p:sldLayout>
 </file>
 
@@ -5631,7 +5631,7 @@
   <p:clrMapOvr>
     <a:masterClrMapping/>
   </p:clrMapOvr>
-  <p:transition xmlns:p14="http://schemas.microsoft.com/office/powerpoint/2010/main"/>
+  <p:transition/>
 </p:sldLayout>
 </file>
 
@@ -5900,7 +5900,7 @@
   <p:clrMapOvr>
     <a:masterClrMapping/>
   </p:clrMapOvr>
-  <p:transition xmlns:p14="http://schemas.microsoft.com/office/powerpoint/2010/main"/>
+  <p:transition/>
 </p:sldLayout>
 </file>
 
@@ -5947,7 +5947,7 @@
             <a:tailEnd/>
           </a:ln>
           <a:extLst>
-            <a:ext uri="{909E8E84-426E-40dd-AFC4-6F175D3DCCD1}">
+            <a:ext uri="{909E8E84-426E-40DD-AFC4-6F175D3DCCD1}">
               <a14:hiddenFill xmlns:a14="http://schemas.microsoft.com/office/drawing/2010/main">
                 <a:noFill/>
               </a14:hiddenFill>
@@ -5988,7 +5988,7 @@
             <a:tailEnd/>
           </a:ln>
           <a:extLst>
-            <a:ext uri="{909E8E84-426E-40dd-AFC4-6F175D3DCCD1}">
+            <a:ext uri="{909E8E84-426E-40DD-AFC4-6F175D3DCCD1}">
               <a14:hiddenFill xmlns:a14="http://schemas.microsoft.com/office/drawing/2010/main">
                 <a:noFill/>
               </a14:hiddenFill>
@@ -6216,7 +6216,7 @@
   <p:clrMapOvr>
     <a:masterClrMapping/>
   </p:clrMapOvr>
-  <p:transition xmlns:p14="http://schemas.microsoft.com/office/powerpoint/2010/main"/>
+  <p:transition/>
 </p:sldLayout>
 </file>
 
@@ -6263,7 +6263,7 @@
             <a:tailEnd/>
           </a:ln>
           <a:extLst>
-            <a:ext uri="{909E8E84-426E-40dd-AFC4-6F175D3DCCD1}">
+            <a:ext uri="{909E8E84-426E-40DD-AFC4-6F175D3DCCD1}">
               <a14:hiddenFill xmlns:a14="http://schemas.microsoft.com/office/drawing/2010/main">
                 <a:noFill/>
               </a14:hiddenFill>
@@ -6304,7 +6304,7 @@
             <a:tailEnd/>
           </a:ln>
           <a:extLst>
-            <a:ext uri="{909E8E84-426E-40dd-AFC4-6F175D3DCCD1}">
+            <a:ext uri="{909E8E84-426E-40DD-AFC4-6F175D3DCCD1}">
               <a14:hiddenFill xmlns:a14="http://schemas.microsoft.com/office/drawing/2010/main">
                 <a:noFill/>
               </a14:hiddenFill>
@@ -6353,14 +6353,14 @@
             <a:noFill/>
           </a:ln>
           <a:extLst>
-            <a:ext uri="{909E8E84-426E-40dd-AFC4-6F175D3DCCD1}">
+            <a:ext uri="{909E8E84-426E-40DD-AFC4-6F175D3DCCD1}">
               <a14:hiddenFill xmlns:a14="http://schemas.microsoft.com/office/drawing/2010/main">
                 <a:solidFill>
                   <a:srgbClr val="FFFFFF"/>
                 </a:solidFill>
               </a14:hiddenFill>
             </a:ext>
-            <a:ext uri="{91240B29-F687-4f45-9708-019B960494DF}">
+            <a:ext uri="{91240B29-F687-4F45-9708-019B960494DF}">
               <a14:hiddenLine xmlns:a14="http://schemas.microsoft.com/office/drawing/2010/main" w="9525">
                 <a:solidFill>
                   <a:srgbClr val="000000"/>
@@ -6559,7 +6559,7 @@
   <p:clrMapOvr>
     <a:masterClrMapping/>
   </p:clrMapOvr>
-  <p:transition xmlns:p14="http://schemas.microsoft.com/office/powerpoint/2010/main"/>
+  <p:transition/>
 </p:sldLayout>
 </file>
 
@@ -6614,14 +6614,14 @@
             <a:noFill/>
           </a:ln>
           <a:extLst>
-            <a:ext uri="{909E8E84-426E-40dd-AFC4-6F175D3DCCD1}">
+            <a:ext uri="{909E8E84-426E-40DD-AFC4-6F175D3DCCD1}">
               <a14:hiddenFill xmlns:a14="http://schemas.microsoft.com/office/drawing/2010/main">
                 <a:solidFill>
                   <a:srgbClr val="FFFFFF"/>
                 </a:solidFill>
               </a14:hiddenFill>
             </a:ext>
-            <a:ext uri="{91240B29-F687-4f45-9708-019B960494DF}">
+            <a:ext uri="{91240B29-F687-4F45-9708-019B960494DF}">
               <a14:hiddenLine xmlns:a14="http://schemas.microsoft.com/office/drawing/2010/main" w="9525">
                 <a:solidFill>
                   <a:srgbClr val="000000"/>
@@ -6660,7 +6660,7 @@
             <a:tailEnd/>
           </a:ln>
           <a:extLst>
-            <a:ext uri="{909E8E84-426E-40dd-AFC4-6F175D3DCCD1}">
+            <a:ext uri="{909E8E84-426E-40DD-AFC4-6F175D3DCCD1}">
               <a14:hiddenFill xmlns:a14="http://schemas.microsoft.com/office/drawing/2010/main">
                 <a:noFill/>
               </a14:hiddenFill>
@@ -6701,7 +6701,7 @@
             <a:tailEnd/>
           </a:ln>
           <a:extLst>
-            <a:ext uri="{909E8E84-426E-40dd-AFC4-6F175D3DCCD1}">
+            <a:ext uri="{909E8E84-426E-40DD-AFC4-6F175D3DCCD1}">
               <a14:hiddenFill xmlns:a14="http://schemas.microsoft.com/office/drawing/2010/main">
                 <a:noFill/>
               </a14:hiddenFill>
@@ -6902,7 +6902,7 @@
   <p:clrMapOvr>
     <a:masterClrMapping/>
   </p:clrMapOvr>
-  <p:transition xmlns:p14="http://schemas.microsoft.com/office/powerpoint/2010/main"/>
+  <p:transition/>
 </p:sldLayout>
 </file>
 
@@ -6957,14 +6957,14 @@
             <a:noFill/>
           </a:ln>
           <a:extLst>
-            <a:ext uri="{909E8E84-426E-40dd-AFC4-6F175D3DCCD1}">
+            <a:ext uri="{909E8E84-426E-40DD-AFC4-6F175D3DCCD1}">
               <a14:hiddenFill xmlns:a14="http://schemas.microsoft.com/office/drawing/2010/main">
                 <a:solidFill>
                   <a:srgbClr val="FFFFFF"/>
                 </a:solidFill>
               </a14:hiddenFill>
             </a:ext>
-            <a:ext uri="{91240B29-F687-4f45-9708-019B960494DF}">
+            <a:ext uri="{91240B29-F687-4F45-9708-019B960494DF}">
               <a14:hiddenLine xmlns:a14="http://schemas.microsoft.com/office/drawing/2010/main" w="9525">
                 <a:solidFill>
                   <a:srgbClr val="000000"/>
@@ -7003,7 +7003,7 @@
             <a:tailEnd/>
           </a:ln>
           <a:extLst>
-            <a:ext uri="{909E8E84-426E-40dd-AFC4-6F175D3DCCD1}">
+            <a:ext uri="{909E8E84-426E-40DD-AFC4-6F175D3DCCD1}">
               <a14:hiddenFill xmlns:a14="http://schemas.microsoft.com/office/drawing/2010/main">
                 <a:noFill/>
               </a14:hiddenFill>
@@ -7044,7 +7044,7 @@
             <a:tailEnd/>
           </a:ln>
           <a:extLst>
-            <a:ext uri="{909E8E84-426E-40dd-AFC4-6F175D3DCCD1}">
+            <a:ext uri="{909E8E84-426E-40DD-AFC4-6F175D3DCCD1}">
               <a14:hiddenFill xmlns:a14="http://schemas.microsoft.com/office/drawing/2010/main">
                 <a:noFill/>
               </a14:hiddenFill>
@@ -7245,7 +7245,7 @@
   <p:clrMapOvr>
     <a:masterClrMapping/>
   </p:clrMapOvr>
-  <p:transition xmlns:p14="http://schemas.microsoft.com/office/powerpoint/2010/main"/>
+  <p:transition/>
 </p:sldLayout>
 </file>
 
@@ -7300,14 +7300,14 @@
             <a:noFill/>
           </a:ln>
           <a:extLst>
-            <a:ext uri="{909E8E84-426E-40dd-AFC4-6F175D3DCCD1}">
+            <a:ext uri="{909E8E84-426E-40DD-AFC4-6F175D3DCCD1}">
               <a14:hiddenFill xmlns:a14="http://schemas.microsoft.com/office/drawing/2010/main">
                 <a:solidFill>
                   <a:srgbClr val="FFFFFF"/>
                 </a:solidFill>
               </a14:hiddenFill>
             </a:ext>
-            <a:ext uri="{91240B29-F687-4f45-9708-019B960494DF}">
+            <a:ext uri="{91240B29-F687-4F45-9708-019B960494DF}">
               <a14:hiddenLine xmlns:a14="http://schemas.microsoft.com/office/drawing/2010/main" w="9525">
                 <a:solidFill>
                   <a:srgbClr val="000000"/>
@@ -7346,7 +7346,7 @@
             <a:tailEnd/>
           </a:ln>
           <a:extLst>
-            <a:ext uri="{909E8E84-426E-40dd-AFC4-6F175D3DCCD1}">
+            <a:ext uri="{909E8E84-426E-40DD-AFC4-6F175D3DCCD1}">
               <a14:hiddenFill xmlns:a14="http://schemas.microsoft.com/office/drawing/2010/main">
                 <a:noFill/>
               </a14:hiddenFill>
@@ -7387,7 +7387,7 @@
             <a:tailEnd/>
           </a:ln>
           <a:extLst>
-            <a:ext uri="{909E8E84-426E-40dd-AFC4-6F175D3DCCD1}">
+            <a:ext uri="{909E8E84-426E-40DD-AFC4-6F175D3DCCD1}">
               <a14:hiddenFill xmlns:a14="http://schemas.microsoft.com/office/drawing/2010/main">
                 <a:noFill/>
               </a14:hiddenFill>
@@ -7732,7 +7732,7 @@
   <p:clrMapOvr>
     <a:masterClrMapping/>
   </p:clrMapOvr>
-  <p:transition xmlns:p14="http://schemas.microsoft.com/office/powerpoint/2010/main"/>
+  <p:transition/>
 </p:sldLayout>
 </file>
 
@@ -7787,7 +7787,7 @@
             <a:tailEnd/>
           </a:ln>
           <a:extLst>
-            <a:ext uri="{909E8E84-426E-40dd-AFC4-6F175D3DCCD1}">
+            <a:ext uri="{909E8E84-426E-40DD-AFC4-6F175D3DCCD1}">
               <a14:hiddenFill xmlns:a14="http://schemas.microsoft.com/office/drawing/2010/main">
                 <a:noFill/>
               </a14:hiddenFill>
@@ -7828,7 +7828,7 @@
             <a:tailEnd/>
           </a:ln>
           <a:extLst>
-            <a:ext uri="{909E8E84-426E-40dd-AFC4-6F175D3DCCD1}">
+            <a:ext uri="{909E8E84-426E-40DD-AFC4-6F175D3DCCD1}">
               <a14:hiddenFill xmlns:a14="http://schemas.microsoft.com/office/drawing/2010/main">
                 <a:noFill/>
               </a14:hiddenFill>
@@ -7850,7 +7850,7 @@
     <p:sldLayoutId id="2147484107" r:id="rId1"/>
     <p:sldLayoutId id="2147484108" r:id="rId2"/>
   </p:sldLayoutIdLst>
-  <p:transition xmlns:p14="http://schemas.microsoft.com/office/powerpoint/2010/main"/>
+  <p:transition/>
   <p:txStyles>
     <p:titleStyle>
       <a:lvl1pPr algn="l" rtl="0" eaLnBrk="1" fontAlgn="base" hangingPunct="1">
@@ -8388,14 +8388,14 @@
           </a:ln>
           <a:effectLst/>
           <a:extLst>
-            <a:ext uri="{909E8E84-426E-40dd-AFC4-6F175D3DCCD1}">
+            <a:ext uri="{909E8E84-426E-40DD-AFC4-6F175D3DCCD1}">
               <a14:hiddenFill xmlns:a14="http://schemas.microsoft.com/office/drawing/2010/main">
                 <a:solidFill>
                   <a:srgbClr val="FFFFFF"/>
                 </a:solidFill>
               </a14:hiddenFill>
             </a:ext>
-            <a:ext uri="{91240B29-F687-4f45-9708-019B960494DF}">
+            <a:ext uri="{91240B29-F687-4F45-9708-019B960494DF}">
               <a14:hiddenLine xmlns:a14="http://schemas.microsoft.com/office/drawing/2010/main" w="12700">
                 <a:solidFill>
                   <a:schemeClr val="tx1"/>
@@ -8405,7 +8405,7 @@
                 <a:tailEnd/>
               </a14:hiddenLine>
             </a:ext>
-            <a:ext uri="{AF507438-7753-43e0-B8FC-AC1667EBCBE1}">
+            <a:ext uri="{AF507438-7753-43E0-B8FC-AC1667EBCBE1}">
               <a14:hiddenEffects xmlns:a14="http://schemas.microsoft.com/office/drawing/2010/main">
                 <a:effectLst>
                   <a:outerShdw blurRad="63500" dist="38099" dir="2700000" algn="ctr" rotWithShape="0">
@@ -8577,7 +8577,7 @@
             <a:tailEnd/>
           </a:ln>
           <a:extLst>
-            <a:ext uri="{909E8E84-426E-40dd-AFC4-6F175D3DCCD1}">
+            <a:ext uri="{909E8E84-426E-40DD-AFC4-6F175D3DCCD1}">
               <a14:hiddenFill xmlns:a14="http://schemas.microsoft.com/office/drawing/2010/main">
                 <a:noFill/>
               </a14:hiddenFill>
@@ -8618,7 +8618,7 @@
             <a:tailEnd/>
           </a:ln>
           <a:extLst>
-            <a:ext uri="{909E8E84-426E-40dd-AFC4-6F175D3DCCD1}">
+            <a:ext uri="{909E8E84-426E-40DD-AFC4-6F175D3DCCD1}">
               <a14:hiddenFill xmlns:a14="http://schemas.microsoft.com/office/drawing/2010/main">
                 <a:noFill/>
               </a14:hiddenFill>
@@ -8651,7 +8651,7 @@
     <p:sldLayoutId id="2147484105" r:id="rId12"/>
     <p:sldLayoutId id="2147484106" r:id="rId13"/>
   </p:sldLayoutIdLst>
-  <p:transition xmlns:p14="http://schemas.microsoft.com/office/powerpoint/2010/main"/>
+  <p:transition/>
   <p:hf hdr="0" ftr="0" dt="0"/>
   <p:txStyles>
     <p:titleStyle>
@@ -9185,8 +9185,12 @@
               <a:defRPr/>
             </a:pPr>
             <a:r>
+              <a:rPr lang="en-US" sz="9000" smtClean="0"/>
+              <a:t>DATA </a:t>
+            </a:r>
+            <a:r>
               <a:rPr lang="en-US" sz="9000" dirty="0" smtClean="0"/>
-              <a:t>DATA SCIENCE</a:t>
+              <a:t>SCIENCE</a:t>
             </a:r>
             <a:br>
               <a:rPr lang="en-US" sz="9000" dirty="0" smtClean="0"/>
@@ -9212,11 +9216,11 @@
   <p:clrMapOvr>
     <a:masterClrMapping/>
   </p:clrMapOvr>
-  <p:transition xmlns:p14="http://schemas.microsoft.com/office/powerpoint/2010/main"/>
+  <p:transition/>
   <p:timing>
     <p:tnLst>
       <p:par>
-        <p:cTn xmlns:p14="http://schemas.microsoft.com/office/powerpoint/2010/main" id="1" dur="indefinite" restart="never" nodeType="tmRoot"/>
+        <p:cTn id="1" dur="indefinite" restart="never" nodeType="tmRoot"/>
       </p:par>
     </p:tnLst>
   </p:timing>
@@ -9337,14 +9341,14 @@
             <a:noFill/>
           </a:ln>
           <a:extLst>
-            <a:ext uri="{909E8E84-426E-40dd-AFC4-6F175D3DCCD1}">
+            <a:ext uri="{909E8E84-426E-40DD-AFC4-6F175D3DCCD1}">
               <a14:hiddenFill xmlns:a14="http://schemas.microsoft.com/office/drawing/2010/main">
                 <a:solidFill>
                   <a:schemeClr val="accent1"/>
                 </a:solidFill>
               </a14:hiddenFill>
             </a:ext>
-            <a:ext uri="{91240B29-F687-4f45-9708-019B960494DF}">
+            <a:ext uri="{91240B29-F687-4F45-9708-019B960494DF}">
               <a14:hiddenLine xmlns:a14="http://schemas.microsoft.com/office/drawing/2010/main" w="9525">
                 <a:solidFill>
                   <a:schemeClr val="tx1"/>
@@ -9435,11 +9439,11 @@
   <p:clrMapOvr>
     <a:masterClrMapping/>
   </p:clrMapOvr>
-  <p:transition xmlns:p14="http://schemas.microsoft.com/office/powerpoint/2010/main"/>
+  <p:transition/>
   <p:timing>
     <p:tnLst>
       <p:par>
-        <p:cTn xmlns:p14="http://schemas.microsoft.com/office/powerpoint/2010/main" id="1" dur="indefinite" restart="never" nodeType="tmRoot">
+        <p:cTn id="1" dur="indefinite" restart="never" nodeType="tmRoot">
           <p:childTnLst>
             <p:seq concurrent="1" nextAc="seek">
               <p:cTn id="2" dur="indefinite" nodeType="mainSeq">
@@ -9681,14 +9685,14 @@
             <a:noFill/>
           </a:ln>
           <a:extLst>
-            <a:ext uri="{909E8E84-426E-40dd-AFC4-6F175D3DCCD1}">
+            <a:ext uri="{909E8E84-426E-40DD-AFC4-6F175D3DCCD1}">
               <a14:hiddenFill xmlns:a14="http://schemas.microsoft.com/office/drawing/2010/main">
                 <a:solidFill>
                   <a:schemeClr val="accent1"/>
                 </a:solidFill>
               </a14:hiddenFill>
             </a:ext>
-            <a:ext uri="{91240B29-F687-4f45-9708-019B960494DF}">
+            <a:ext uri="{91240B29-F687-4F45-9708-019B960494DF}">
               <a14:hiddenLine xmlns:a14="http://schemas.microsoft.com/office/drawing/2010/main" w="9525">
                 <a:solidFill>
                   <a:schemeClr val="tx1"/>
@@ -9862,7 +9866,7 @@
           </a:ln>
           <a:effectLst/>
           <a:extLst>
-            <a:ext uri="{AF507438-7753-43e0-B8FC-AC1667EBCBE1}">
+            <a:ext uri="{AF507438-7753-43E0-B8FC-AC1667EBCBE1}">
               <a14:hiddenEffects xmlns:a14="http://schemas.microsoft.com/office/drawing/2010/main">
                 <a:effectLst>
                   <a:outerShdw blurRad="63500" dist="38099" dir="2700000" algn="ctr" rotWithShape="0">
@@ -9904,7 +9908,7 @@
           </a:ln>
           <a:effectLst/>
           <a:extLst>
-            <a:ext uri="{AF507438-7753-43e0-B8FC-AC1667EBCBE1}">
+            <a:ext uri="{AF507438-7753-43E0-B8FC-AC1667EBCBE1}">
               <a14:hiddenEffects xmlns:a14="http://schemas.microsoft.com/office/drawing/2010/main">
                 <a:effectLst>
                   <a:outerShdw blurRad="63500" dist="38099" dir="2700000" algn="ctr" rotWithShape="0">
@@ -9946,7 +9950,7 @@
           </a:ln>
           <a:effectLst/>
           <a:extLst>
-            <a:ext uri="{AF507438-7753-43e0-B8FC-AC1667EBCBE1}">
+            <a:ext uri="{AF507438-7753-43E0-B8FC-AC1667EBCBE1}">
               <a14:hiddenEffects xmlns:a14="http://schemas.microsoft.com/office/drawing/2010/main">
                 <a:effectLst>
                   <a:outerShdw blurRad="63500" dist="38099" dir="2700000" algn="ctr" rotWithShape="0">
@@ -9970,11 +9974,11 @@
   <p:clrMapOvr>
     <a:masterClrMapping/>
   </p:clrMapOvr>
-  <p:transition xmlns:p14="http://schemas.microsoft.com/office/powerpoint/2010/main"/>
+  <p:transition/>
   <p:timing>
     <p:tnLst>
       <p:par>
-        <p:cTn xmlns:p14="http://schemas.microsoft.com/office/powerpoint/2010/main" id="1" dur="indefinite" restart="never" nodeType="tmRoot">
+        <p:cTn id="1" dur="indefinite" restart="never" nodeType="tmRoot">
           <p:childTnLst>
             <p:seq concurrent="1" nextAc="seek">
               <p:cTn id="2" dur="indefinite" nodeType="mainSeq">
@@ -10363,11 +10367,11 @@
   <p:clrMapOvr>
     <a:masterClrMapping/>
   </p:clrMapOvr>
-  <p:transition xmlns:p14="http://schemas.microsoft.com/office/powerpoint/2010/main"/>
+  <p:transition/>
   <p:timing>
     <p:tnLst>
       <p:par>
-        <p:cTn xmlns:p14="http://schemas.microsoft.com/office/powerpoint/2010/main" id="1" dur="indefinite" restart="never" nodeType="tmRoot">
+        <p:cTn id="1" dur="indefinite" restart="never" nodeType="tmRoot">
           <p:childTnLst>
             <p:seq concurrent="1" nextAc="seek">
               <p:cTn id="2" dur="indefinite" nodeType="mainSeq">
@@ -10666,11 +10670,11 @@
   <p:clrMapOvr>
     <a:masterClrMapping/>
   </p:clrMapOvr>
-  <p:transition xmlns:p14="http://schemas.microsoft.com/office/powerpoint/2010/main"/>
+  <p:transition/>
   <p:timing>
     <p:tnLst>
       <p:par>
-        <p:cTn xmlns:p14="http://schemas.microsoft.com/office/powerpoint/2010/main" id="1" dur="indefinite" restart="never" nodeType="tmRoot"/>
+        <p:cTn id="1" dur="indefinite" restart="never" nodeType="tmRoot"/>
       </p:par>
     </p:tnLst>
   </p:timing>
@@ -11031,11 +11035,11 @@
   <p:clrMapOvr>
     <a:masterClrMapping/>
   </p:clrMapOvr>
-  <p:transition xmlns:p14="http://schemas.microsoft.com/office/powerpoint/2010/main"/>
+  <p:transition/>
   <p:timing>
     <p:tnLst>
       <p:par>
-        <p:cTn xmlns:p14="http://schemas.microsoft.com/office/powerpoint/2010/main" id="1" dur="indefinite" restart="never" nodeType="tmRoot">
+        <p:cTn id="1" dur="indefinite" restart="never" nodeType="tmRoot">
           <p:childTnLst>
             <p:seq concurrent="1" nextAc="seek">
               <p:cTn id="2" dur="indefinite" nodeType="mainSeq">
@@ -11390,7 +11394,7 @@
           </a:ln>
           <a:effectLst/>
           <a:extLst>
-            <a:ext uri="{AF507438-7753-43e0-B8FC-AC1667EBCBE1}">
+            <a:ext uri="{AF507438-7753-43E0-B8FC-AC1667EBCBE1}">
               <a14:hiddenEffects xmlns:a14="http://schemas.microsoft.com/office/drawing/2010/main">
                 <a:effectLst>
                   <a:outerShdw blurRad="63500" dist="38099" dir="2700000" algn="ctr" rotWithShape="0">
@@ -11414,11 +11418,11 @@
   <p:clrMapOvr>
     <a:masterClrMapping/>
   </p:clrMapOvr>
-  <p:transition xmlns:p14="http://schemas.microsoft.com/office/powerpoint/2010/main"/>
+  <p:transition/>
   <p:timing>
     <p:tnLst>
       <p:par>
-        <p:cTn xmlns:p14="http://schemas.microsoft.com/office/powerpoint/2010/main" id="1" dur="indefinite" restart="never" nodeType="tmRoot"/>
+        <p:cTn id="1" dur="indefinite" restart="never" nodeType="tmRoot"/>
       </p:par>
     </p:tnLst>
   </p:timing>
@@ -11678,7 +11682,7 @@
           </a:ln>
           <a:effectLst/>
           <a:extLst>
-            <a:ext uri="{AF507438-7753-43e0-B8FC-AC1667EBCBE1}">
+            <a:ext uri="{AF507438-7753-43E0-B8FC-AC1667EBCBE1}">
               <a14:hiddenEffects xmlns:a14="http://schemas.microsoft.com/office/drawing/2010/main">
                 <a:effectLst>
                   <a:outerShdw blurRad="63500" dist="38099" dir="2700000" algn="ctr" rotWithShape="0">
@@ -11702,11 +11706,11 @@
   <p:clrMapOvr>
     <a:masterClrMapping/>
   </p:clrMapOvr>
-  <p:transition xmlns:p14="http://schemas.microsoft.com/office/powerpoint/2010/main"/>
+  <p:transition/>
   <p:timing>
     <p:tnLst>
       <p:par>
-        <p:cTn xmlns:p14="http://schemas.microsoft.com/office/powerpoint/2010/main" id="1" dur="indefinite" restart="never" nodeType="tmRoot"/>
+        <p:cTn id="1" dur="indefinite" restart="never" nodeType="tmRoot"/>
       </p:par>
     </p:tnLst>
   </p:timing>
@@ -11935,7 +11939,7 @@
           </a:ln>
           <a:effectLst/>
           <a:extLst>
-            <a:ext uri="{AF507438-7753-43e0-B8FC-AC1667EBCBE1}">
+            <a:ext uri="{AF507438-7753-43E0-B8FC-AC1667EBCBE1}">
               <a14:hiddenEffects xmlns:a14="http://schemas.microsoft.com/office/drawing/2010/main">
                 <a:effectLst>
                   <a:outerShdw blurRad="63500" dist="38099" dir="2700000" algn="ctr" rotWithShape="0">
@@ -11959,11 +11963,11 @@
   <p:clrMapOvr>
     <a:masterClrMapping/>
   </p:clrMapOvr>
-  <p:transition xmlns:p14="http://schemas.microsoft.com/office/powerpoint/2010/main"/>
+  <p:transition/>
   <p:timing>
     <p:tnLst>
       <p:par>
-        <p:cTn xmlns:p14="http://schemas.microsoft.com/office/powerpoint/2010/main" id="1" dur="indefinite" restart="never" nodeType="tmRoot"/>
+        <p:cTn id="1" dur="indefinite" restart="never" nodeType="tmRoot"/>
       </p:par>
     </p:tnLst>
   </p:timing>
@@ -12202,7 +12206,7 @@
           </a:ln>
           <a:effectLst/>
           <a:extLst>
-            <a:ext uri="{AF507438-7753-43e0-B8FC-AC1667EBCBE1}">
+            <a:ext uri="{AF507438-7753-43E0-B8FC-AC1667EBCBE1}">
               <a14:hiddenEffects xmlns:a14="http://schemas.microsoft.com/office/drawing/2010/main">
                 <a:effectLst>
                   <a:outerShdw blurRad="63500" dist="38099" dir="2700000" algn="ctr" rotWithShape="0">
@@ -12290,11 +12294,11 @@
   <p:clrMapOvr>
     <a:masterClrMapping/>
   </p:clrMapOvr>
-  <p:transition xmlns:p14="http://schemas.microsoft.com/office/powerpoint/2010/main"/>
+  <p:transition/>
   <p:timing>
     <p:tnLst>
       <p:par>
-        <p:cTn xmlns:p14="http://schemas.microsoft.com/office/powerpoint/2010/main" id="1" dur="indefinite" restart="never" nodeType="tmRoot">
+        <p:cTn id="1" dur="indefinite" restart="never" nodeType="tmRoot">
           <p:childTnLst>
             <p:seq concurrent="1" nextAc="seek">
               <p:cTn id="2" dur="indefinite" nodeType="mainSeq">
@@ -12642,11 +12646,11 @@
   <p:clrMapOvr>
     <a:masterClrMapping/>
   </p:clrMapOvr>
-  <p:transition xmlns:p14="http://schemas.microsoft.com/office/powerpoint/2010/main"/>
+  <p:transition/>
   <p:timing>
     <p:tnLst>
       <p:par>
-        <p:cTn xmlns:p14="http://schemas.microsoft.com/office/powerpoint/2010/main" id="1" dur="indefinite" restart="never" nodeType="tmRoot">
+        <p:cTn id="1" dur="indefinite" restart="never" nodeType="tmRoot">
           <p:childTnLst>
             <p:seq concurrent="1" nextAc="seek">
               <p:cTn id="2" dur="indefinite" nodeType="mainSeq">
@@ -12838,14 +12842,14 @@
             <a:ext cx="8429625" cy="3695700"/>
           </a:xfrm>
           <a:extLst>
-            <a:ext uri="{909E8E84-426E-40dd-AFC4-6F175D3DCCD1}">
+            <a:ext uri="{909E8E84-426E-40DD-AFC4-6F175D3DCCD1}">
               <a14:hiddenFill xmlns:a14="http://schemas.microsoft.com/office/drawing/2010/main">
                 <a:solidFill>
                   <a:srgbClr val="FFFFFF"/>
                 </a:solidFill>
               </a14:hiddenFill>
             </a:ext>
-            <a:ext uri="{91240B29-F687-4f45-9708-019B960494DF}">
+            <a:ext uri="{91240B29-F687-4F45-9708-019B960494DF}">
               <a14:hiddenLine xmlns:a14="http://schemas.microsoft.com/office/drawing/2010/main" w="9525">
                 <a:solidFill>
                   <a:srgbClr val="000000"/>
@@ -12856,7 +12860,7 @@
               </a14:hiddenLine>
             </a:ext>
             <a:ext uri="{FAA26D3D-D897-4be2-8F04-BA451C77F1D7}">
-              <ma14:placeholderFlag xmlns:ma14="http://schemas.microsoft.com/office/mac/drawingml/2011/main" val="1"/>
+              <ma14:placeholderFlag xmlns="" xmlns:ma14="http://schemas.microsoft.com/office/mac/drawingml/2011/main" val="1"/>
             </a:ext>
           </a:extLst>
         </p:spPr>
@@ -12875,6 +12879,59 @@
               <a:defRPr/>
             </a:pPr>
             <a:r>
+              <a:rPr lang="en-US" sz="3000" smtClean="0">
+                <a:latin typeface="PFDinTextCompPro-Bold" charset="0"/>
+                <a:ea typeface="ヒラギノ角ゴ ProN W6" charset="0"/>
+                <a:cs typeface="ヒラギノ角ゴ ProN W6" charset="0"/>
+              </a:rPr>
+              <a:t/>
+            </a:r>
+            <a:br>
+              <a:rPr lang="en-US" sz="3000" smtClean="0">
+                <a:latin typeface="PFDinTextCompPro-Bold" charset="0"/>
+                <a:ea typeface="ヒラギノ角ゴ ProN W6" charset="0"/>
+                <a:cs typeface="ヒラギノ角ゴ ProN W6" charset="0"/>
+              </a:rPr>
+            </a:br>
+            <a:r>
+              <a:rPr lang="en-US" sz="3000" smtClean="0">
+                <a:latin typeface="PFDinTextCompPro-Bold" charset="0"/>
+                <a:ea typeface="ヒラギノ角ゴ ProN W6" charset="0"/>
+                <a:cs typeface="ヒラギノ角ゴ ProN W6" charset="0"/>
+              </a:rPr>
+              <a:t/>
+            </a:r>
+            <a:br>
+              <a:rPr lang="en-US" sz="3000" smtClean="0">
+                <a:latin typeface="PFDinTextCompPro-Bold" charset="0"/>
+                <a:ea typeface="ヒラギノ角ゴ ProN W6" charset="0"/>
+                <a:cs typeface="ヒラギノ角ゴ ProN W6" charset="0"/>
+              </a:rPr>
+            </a:br>
+            <a:r>
+              <a:rPr lang="en-US" sz="3000" smtClean="0">
+                <a:latin typeface="PFDinTextCompPro-Bold" charset="0"/>
+                <a:ea typeface="ヒラギノ角ゴ ProN W6" charset="0"/>
+                <a:cs typeface="ヒラギノ角ゴ ProN W6" charset="0"/>
+              </a:rPr>
+              <a:t/>
+            </a:r>
+            <a:br>
+              <a:rPr lang="en-US" sz="3000" smtClean="0">
+                <a:latin typeface="PFDinTextCompPro-Bold" charset="0"/>
+                <a:ea typeface="ヒラギノ角ゴ ProN W6" charset="0"/>
+                <a:cs typeface="ヒラギノ角ゴ ProN W6" charset="0"/>
+              </a:rPr>
+            </a:br>
+            <a:r>
+              <a:rPr lang="en-US" sz="3000" smtClean="0">
+                <a:latin typeface="PFDinTextCompPro-Bold" charset="0"/>
+                <a:ea typeface="ヒラギノ角ゴ ProN W6" charset="0"/>
+                <a:cs typeface="ヒラギノ角ゴ ProN W6" charset="0"/>
+              </a:rPr>
+              <a:t>I. probability and Bayes’ Theorem</a:t>
+            </a:r>
+            <a:r>
               <a:rPr lang="en-US" sz="3000" dirty="0" smtClean="0">
                 <a:latin typeface="PFDinTextCompPro-Bold" charset="0"/>
                 <a:ea typeface="ヒラギノ角ゴ ProN W6" charset="0"/>
@@ -12890,65 +12947,28 @@
               </a:rPr>
             </a:br>
             <a:r>
+              <a:rPr lang="en-US" sz="3000" dirty="0" err="1" smtClean="0">
+                <a:latin typeface="PFDinTextCompPro-Bold" charset="0"/>
+                <a:ea typeface="ヒラギノ角ゴ ProN W6" charset="0"/>
+                <a:cs typeface="ヒラギノ角ゴ ProN W6" charset="0"/>
+              </a:rPr>
+              <a:t>iI</a:t>
+            </a:r>
+            <a:r>
               <a:rPr lang="en-US" sz="3000" dirty="0" smtClean="0">
                 <a:latin typeface="PFDinTextCompPro-Bold" charset="0"/>
                 <a:ea typeface="ヒラギノ角ゴ ProN W6" charset="0"/>
                 <a:cs typeface="ヒラギノ角ゴ ProN W6" charset="0"/>
               </a:rPr>
-              <a:t/>
-            </a:r>
-            <a:br>
-              <a:rPr lang="en-US" sz="3000" dirty="0" smtClean="0">
+              <a:t>. Naïve </a:t>
+            </a:r>
+            <a:r>
+              <a:rPr lang="en-US" sz="3000" smtClean="0">
                 <a:latin typeface="PFDinTextCompPro-Bold" charset="0"/>
                 <a:ea typeface="ヒラギノ角ゴ ProN W6" charset="0"/>
                 <a:cs typeface="ヒラギノ角ゴ ProN W6" charset="0"/>
               </a:rPr>
-            </a:br>
-            <a:r>
-              <a:rPr lang="en-US" sz="3000" dirty="0" smtClean="0">
-                <a:latin typeface="PFDinTextCompPro-Bold" charset="0"/>
-                <a:ea typeface="ヒラギノ角ゴ ProN W6" charset="0"/>
-                <a:cs typeface="ヒラギノ角ゴ ProN W6" charset="0"/>
-              </a:rPr>
-              <a:t/>
-            </a:r>
-            <a:br>
-              <a:rPr lang="en-US" sz="3000" dirty="0" smtClean="0">
-                <a:latin typeface="PFDinTextCompPro-Bold" charset="0"/>
-                <a:ea typeface="ヒラギノ角ゴ ProN W6" charset="0"/>
-                <a:cs typeface="ヒラギノ角ゴ ProN W6" charset="0"/>
-              </a:rPr>
-            </a:br>
-            <a:r>
-              <a:rPr lang="en-US" sz="3000" dirty="0" smtClean="0">
-                <a:latin typeface="PFDinTextCompPro-Bold" charset="0"/>
-                <a:ea typeface="ヒラギノ角ゴ ProN W6" charset="0"/>
-                <a:cs typeface="ヒラギノ角ゴ ProN W6" charset="0"/>
-              </a:rPr>
-              <a:t>I. probability and Bayes’ Theorem</a:t>
-            </a:r>
-            <a:br>
-              <a:rPr lang="en-US" sz="3000" dirty="0" smtClean="0">
-                <a:latin typeface="PFDinTextCompPro-Bold" charset="0"/>
-                <a:ea typeface="ヒラギノ角ゴ ProN W6" charset="0"/>
-                <a:cs typeface="ヒラギノ角ゴ ProN W6" charset="0"/>
-              </a:rPr>
-            </a:br>
-            <a:r>
-              <a:rPr lang="en-US" sz="3000" dirty="0" err="1" smtClean="0">
-                <a:latin typeface="PFDinTextCompPro-Bold" charset="0"/>
-                <a:ea typeface="ヒラギノ角ゴ ProN W6" charset="0"/>
-                <a:cs typeface="ヒラギノ角ゴ ProN W6" charset="0"/>
-              </a:rPr>
-              <a:t>iI</a:t>
-            </a:r>
-            <a:r>
-              <a:rPr lang="en-US" sz="3000" dirty="0" smtClean="0">
-                <a:latin typeface="PFDinTextCompPro-Bold" charset="0"/>
-                <a:ea typeface="ヒラギノ角ゴ ProN W6" charset="0"/>
-                <a:cs typeface="ヒラギノ角ゴ ProN W6" charset="0"/>
-              </a:rPr>
-              <a:t>. Naïve Bayes classification</a:t>
+              <a:t>Bayes classification</a:t>
             </a:r>
             <a:endParaRPr lang="en-US" sz="3000" cap="none" dirty="0">
               <a:latin typeface="PFDinTextCompPro-Bold" charset="0"/>
@@ -13044,11 +13064,11 @@
   <p:clrMapOvr>
     <a:masterClrMapping/>
   </p:clrMapOvr>
-  <p:transition xmlns:p14="http://schemas.microsoft.com/office/powerpoint/2010/main"/>
+  <p:transition/>
   <p:timing>
     <p:tnLst>
       <p:par>
-        <p:cTn xmlns:p14="http://schemas.microsoft.com/office/powerpoint/2010/main" id="1" dur="indefinite" restart="never" nodeType="tmRoot"/>
+        <p:cTn id="1" dur="indefinite" restart="never" nodeType="tmRoot"/>
       </p:par>
     </p:tnLst>
   </p:timing>
@@ -13432,11 +13452,11 @@
   <p:clrMapOvr>
     <a:masterClrMapping/>
   </p:clrMapOvr>
-  <p:transition xmlns:p14="http://schemas.microsoft.com/office/powerpoint/2010/main"/>
+  <p:transition/>
   <p:timing>
     <p:tnLst>
       <p:par>
-        <p:cTn xmlns:p14="http://schemas.microsoft.com/office/powerpoint/2010/main" id="1" dur="indefinite" restart="never" nodeType="tmRoot">
+        <p:cTn id="1" dur="indefinite" restart="never" nodeType="tmRoot">
           <p:childTnLst>
             <p:seq concurrent="1" nextAc="seek">
               <p:cTn id="2" dur="indefinite" nodeType="mainSeq">
@@ -13837,7 +13857,7 @@
           </a:ln>
           <a:effectLst/>
           <a:extLst>
-            <a:ext uri="{AF507438-7753-43e0-B8FC-AC1667EBCBE1}">
+            <a:ext uri="{AF507438-7753-43E0-B8FC-AC1667EBCBE1}">
               <a14:hiddenEffects xmlns:a14="http://schemas.microsoft.com/office/drawing/2010/main">
                 <a:effectLst>
                   <a:outerShdw blurRad="63500" dist="38099" dir="2700000" algn="ctr" rotWithShape="0">
@@ -13879,7 +13899,7 @@
           </a:ln>
           <a:effectLst/>
           <a:extLst>
-            <a:ext uri="{AF507438-7753-43e0-B8FC-AC1667EBCBE1}">
+            <a:ext uri="{AF507438-7753-43E0-B8FC-AC1667EBCBE1}">
               <a14:hiddenEffects xmlns:a14="http://schemas.microsoft.com/office/drawing/2010/main">
                 <a:effectLst>
                   <a:outerShdw blurRad="63500" dist="38099" dir="2700000" algn="ctr" rotWithShape="0">
@@ -13903,11 +13923,11 @@
   <p:clrMapOvr>
     <a:masterClrMapping/>
   </p:clrMapOvr>
-  <p:transition xmlns:p14="http://schemas.microsoft.com/office/powerpoint/2010/main"/>
+  <p:transition/>
   <p:timing>
     <p:tnLst>
       <p:par>
-        <p:cTn xmlns:p14="http://schemas.microsoft.com/office/powerpoint/2010/main" id="1" dur="indefinite" restart="never" nodeType="tmRoot">
+        <p:cTn id="1" dur="indefinite" restart="never" nodeType="tmRoot">
           <p:childTnLst>
             <p:seq concurrent="1" nextAc="seek">
               <p:cTn id="2" dur="indefinite" nodeType="mainSeq">
@@ -14116,11 +14136,11 @@
   <p:clrMapOvr>
     <a:masterClrMapping/>
   </p:clrMapOvr>
-  <p:transition xmlns:p14="http://schemas.microsoft.com/office/powerpoint/2010/main"/>
+  <p:transition/>
   <p:timing>
     <p:tnLst>
       <p:par>
-        <p:cTn xmlns:p14="http://schemas.microsoft.com/office/powerpoint/2010/main" id="1" dur="indefinite" restart="never" nodeType="tmRoot"/>
+        <p:cTn id="1" dur="indefinite" restart="never" nodeType="tmRoot"/>
       </p:par>
     </p:tnLst>
   </p:timing>
@@ -14252,11 +14272,11 @@
   <p:clrMapOvr>
     <a:masterClrMapping/>
   </p:clrMapOvr>
-  <p:transition xmlns:p14="http://schemas.microsoft.com/office/powerpoint/2010/main"/>
+  <p:transition/>
   <p:timing>
     <p:tnLst>
       <p:par>
-        <p:cTn xmlns:p14="http://schemas.microsoft.com/office/powerpoint/2010/main" id="1" dur="indefinite" restart="never" nodeType="tmRoot"/>
+        <p:cTn id="1" dur="indefinite" restart="never" nodeType="tmRoot"/>
       </p:par>
     </p:tnLst>
   </p:timing>
@@ -14377,14 +14397,14 @@
             <a:noFill/>
           </a:ln>
           <a:extLst>
-            <a:ext uri="{909E8E84-426E-40dd-AFC4-6F175D3DCCD1}">
+            <a:ext uri="{909E8E84-426E-40DD-AFC4-6F175D3DCCD1}">
               <a14:hiddenFill xmlns:a14="http://schemas.microsoft.com/office/drawing/2010/main">
                 <a:solidFill>
                   <a:schemeClr val="accent1"/>
                 </a:solidFill>
               </a14:hiddenFill>
             </a:ext>
-            <a:ext uri="{91240B29-F687-4f45-9708-019B960494DF}">
+            <a:ext uri="{91240B29-F687-4F45-9708-019B960494DF}">
               <a14:hiddenLine xmlns:a14="http://schemas.microsoft.com/office/drawing/2010/main" w="9525">
                 <a:solidFill>
                   <a:schemeClr val="tx1"/>
@@ -14499,11 +14519,11 @@
   <p:clrMapOvr>
     <a:masterClrMapping/>
   </p:clrMapOvr>
-  <p:transition xmlns:p14="http://schemas.microsoft.com/office/powerpoint/2010/main"/>
+  <p:transition/>
   <p:timing>
     <p:tnLst>
       <p:par>
-        <p:cTn xmlns:p14="http://schemas.microsoft.com/office/powerpoint/2010/main" id="1" dur="indefinite" restart="never" nodeType="tmRoot">
+        <p:cTn id="1" dur="indefinite" restart="never" nodeType="tmRoot">
           <p:childTnLst>
             <p:seq concurrent="1" nextAc="seek">
               <p:cTn id="2" dur="indefinite" nodeType="mainSeq">
@@ -14794,14 +14814,14 @@
             <a:noFill/>
           </a:ln>
           <a:extLst>
-            <a:ext uri="{909E8E84-426E-40dd-AFC4-6F175D3DCCD1}">
+            <a:ext uri="{909E8E84-426E-40DD-AFC4-6F175D3DCCD1}">
               <a14:hiddenFill xmlns:a14="http://schemas.microsoft.com/office/drawing/2010/main">
                 <a:solidFill>
                   <a:schemeClr val="accent1"/>
                 </a:solidFill>
               </a14:hiddenFill>
             </a:ext>
-            <a:ext uri="{91240B29-F687-4f45-9708-019B960494DF}">
+            <a:ext uri="{91240B29-F687-4F45-9708-019B960494DF}">
               <a14:hiddenLine xmlns:a14="http://schemas.microsoft.com/office/drawing/2010/main" w="9525">
                 <a:solidFill>
                   <a:schemeClr val="tx1"/>
@@ -14929,11 +14949,11 @@
   <p:clrMapOvr>
     <a:masterClrMapping/>
   </p:clrMapOvr>
-  <p:transition xmlns:p14="http://schemas.microsoft.com/office/powerpoint/2010/main"/>
+  <p:transition/>
   <p:timing>
     <p:tnLst>
       <p:par>
-        <p:cTn xmlns:p14="http://schemas.microsoft.com/office/powerpoint/2010/main" id="1" dur="indefinite" restart="never" nodeType="tmRoot">
+        <p:cTn id="1" dur="indefinite" restart="never" nodeType="tmRoot">
           <p:childTnLst>
             <p:seq concurrent="1" nextAc="seek">
               <p:cTn id="2" dur="indefinite" nodeType="mainSeq">
@@ -15273,14 +15293,14 @@
             <a:noFill/>
           </a:ln>
           <a:extLst>
-            <a:ext uri="{909E8E84-426E-40dd-AFC4-6F175D3DCCD1}">
+            <a:ext uri="{909E8E84-426E-40DD-AFC4-6F175D3DCCD1}">
               <a14:hiddenFill xmlns:a14="http://schemas.microsoft.com/office/drawing/2010/main">
                 <a:solidFill>
                   <a:schemeClr val="accent1"/>
                 </a:solidFill>
               </a14:hiddenFill>
             </a:ext>
-            <a:ext uri="{91240B29-F687-4f45-9708-019B960494DF}">
+            <a:ext uri="{91240B29-F687-4F45-9708-019B960494DF}">
               <a14:hiddenLine xmlns:a14="http://schemas.microsoft.com/office/drawing/2010/main" w="9525">
                 <a:solidFill>
                   <a:schemeClr val="tx1"/>
@@ -15363,11 +15383,11 @@
   <p:clrMapOvr>
     <a:masterClrMapping/>
   </p:clrMapOvr>
-  <p:transition xmlns:p14="http://schemas.microsoft.com/office/powerpoint/2010/main"/>
+  <p:transition/>
   <p:timing>
     <p:tnLst>
       <p:par>
-        <p:cTn xmlns:p14="http://schemas.microsoft.com/office/powerpoint/2010/main" id="1" dur="indefinite" restart="never" nodeType="tmRoot">
+        <p:cTn id="1" dur="indefinite" restart="never" nodeType="tmRoot">
           <p:childTnLst>
             <p:seq concurrent="1" nextAc="seek">
               <p:cTn id="2" dur="indefinite" nodeType="mainSeq">
@@ -15658,14 +15678,14 @@
             <a:noFill/>
           </a:ln>
           <a:extLst>
-            <a:ext uri="{909E8E84-426E-40dd-AFC4-6F175D3DCCD1}">
+            <a:ext uri="{909E8E84-426E-40DD-AFC4-6F175D3DCCD1}">
               <a14:hiddenFill xmlns:a14="http://schemas.microsoft.com/office/drawing/2010/main">
                 <a:solidFill>
                   <a:schemeClr val="accent1"/>
                 </a:solidFill>
               </a14:hiddenFill>
             </a:ext>
-            <a:ext uri="{91240B29-F687-4f45-9708-019B960494DF}">
+            <a:ext uri="{91240B29-F687-4F45-9708-019B960494DF}">
               <a14:hiddenLine xmlns:a14="http://schemas.microsoft.com/office/drawing/2010/main" w="9525">
                 <a:solidFill>
                   <a:schemeClr val="tx1"/>
@@ -15785,11 +15805,11 @@
   <p:clrMapOvr>
     <a:masterClrMapping/>
   </p:clrMapOvr>
-  <p:transition xmlns:p14="http://schemas.microsoft.com/office/powerpoint/2010/main"/>
+  <p:transition/>
   <p:timing>
     <p:tnLst>
       <p:par>
-        <p:cTn xmlns:p14="http://schemas.microsoft.com/office/powerpoint/2010/main" id="1" dur="indefinite" restart="never" nodeType="tmRoot">
+        <p:cTn id="1" dur="indefinite" restart="never" nodeType="tmRoot">
           <p:childTnLst>
             <p:seq concurrent="1" nextAc="seek">
               <p:cTn id="2" dur="indefinite" nodeType="mainSeq">
@@ -16227,14 +16247,14 @@
             <a:noFill/>
           </a:ln>
           <a:extLst>
-            <a:ext uri="{909E8E84-426E-40dd-AFC4-6F175D3DCCD1}">
+            <a:ext uri="{909E8E84-426E-40DD-AFC4-6F175D3DCCD1}">
               <a14:hiddenFill xmlns:a14="http://schemas.microsoft.com/office/drawing/2010/main">
                 <a:solidFill>
                   <a:schemeClr val="accent1"/>
                 </a:solidFill>
               </a14:hiddenFill>
             </a:ext>
-            <a:ext uri="{91240B29-F687-4f45-9708-019B960494DF}">
+            <a:ext uri="{91240B29-F687-4F45-9708-019B960494DF}">
               <a14:hiddenLine xmlns:a14="http://schemas.microsoft.com/office/drawing/2010/main" w="9525">
                 <a:solidFill>
                   <a:schemeClr val="tx1"/>
@@ -16429,7 +16449,7 @@
           </a:ln>
           <a:effectLst/>
           <a:extLst>
-            <a:ext uri="{AF507438-7753-43e0-B8FC-AC1667EBCBE1}">
+            <a:ext uri="{AF507438-7753-43E0-B8FC-AC1667EBCBE1}">
               <a14:hiddenEffects xmlns:a14="http://schemas.microsoft.com/office/drawing/2010/main">
                 <a:effectLst>
                   <a:outerShdw blurRad="63500" dist="38099" dir="2700000" algn="ctr" rotWithShape="0">
@@ -16471,7 +16491,7 @@
           </a:ln>
           <a:effectLst/>
           <a:extLst>
-            <a:ext uri="{AF507438-7753-43e0-B8FC-AC1667EBCBE1}">
+            <a:ext uri="{AF507438-7753-43E0-B8FC-AC1667EBCBE1}">
               <a14:hiddenEffects xmlns:a14="http://schemas.microsoft.com/office/drawing/2010/main">
                 <a:effectLst>
                   <a:outerShdw blurRad="63500" dist="38099" dir="2700000" algn="ctr" rotWithShape="0">
@@ -16513,7 +16533,7 @@
           </a:ln>
           <a:effectLst/>
           <a:extLst>
-            <a:ext uri="{AF507438-7753-43e0-B8FC-AC1667EBCBE1}">
+            <a:ext uri="{AF507438-7753-43E0-B8FC-AC1667EBCBE1}">
               <a14:hiddenEffects xmlns:a14="http://schemas.microsoft.com/office/drawing/2010/main">
                 <a:effectLst>
                   <a:outerShdw blurRad="63500" dist="38099" dir="2700000" algn="ctr" rotWithShape="0">
@@ -16561,14 +16581,14 @@
             <a:noFill/>
           </a:ln>
           <a:extLst>
-            <a:ext uri="{909E8E84-426E-40dd-AFC4-6F175D3DCCD1}">
+            <a:ext uri="{909E8E84-426E-40DD-AFC4-6F175D3DCCD1}">
               <a14:hiddenFill xmlns:a14="http://schemas.microsoft.com/office/drawing/2010/main">
                 <a:solidFill>
                   <a:schemeClr val="accent1"/>
                 </a:solidFill>
               </a14:hiddenFill>
             </a:ext>
-            <a:ext uri="{91240B29-F687-4f45-9708-019B960494DF}">
+            <a:ext uri="{91240B29-F687-4F45-9708-019B960494DF}">
               <a14:hiddenLine xmlns:a14="http://schemas.microsoft.com/office/drawing/2010/main" w="9525">
                 <a:solidFill>
                   <a:schemeClr val="tx1"/>
@@ -16591,11 +16611,11 @@
   <p:clrMapOvr>
     <a:masterClrMapping/>
   </p:clrMapOvr>
-  <p:transition xmlns:p14="http://schemas.microsoft.com/office/powerpoint/2010/main"/>
+  <p:transition/>
   <p:timing>
     <p:tnLst>
       <p:par>
-        <p:cTn xmlns:p14="http://schemas.microsoft.com/office/powerpoint/2010/main" id="1" dur="indefinite" restart="never" nodeType="tmRoot">
+        <p:cTn id="1" dur="indefinite" restart="never" nodeType="tmRoot">
           <p:childTnLst>
             <p:seq concurrent="1" nextAc="seek">
               <p:cTn id="2" dur="indefinite" nodeType="mainSeq">
@@ -17054,14 +17074,14 @@
             <a:noFill/>
           </a:ln>
           <a:extLst>
-            <a:ext uri="{909E8E84-426E-40dd-AFC4-6F175D3DCCD1}">
+            <a:ext uri="{909E8E84-426E-40DD-AFC4-6F175D3DCCD1}">
               <a14:hiddenFill xmlns:a14="http://schemas.microsoft.com/office/drawing/2010/main">
                 <a:solidFill>
                   <a:schemeClr val="accent1"/>
                 </a:solidFill>
               </a14:hiddenFill>
             </a:ext>
-            <a:ext uri="{91240B29-F687-4f45-9708-019B960494DF}">
+            <a:ext uri="{91240B29-F687-4F45-9708-019B960494DF}">
               <a14:hiddenLine xmlns:a14="http://schemas.microsoft.com/office/drawing/2010/main" w="9525">
                 <a:solidFill>
                   <a:schemeClr val="tx1"/>
@@ -17287,7 +17307,7 @@
           </a:ln>
           <a:effectLst/>
           <a:extLst>
-            <a:ext uri="{AF507438-7753-43e0-B8FC-AC1667EBCBE1}">
+            <a:ext uri="{AF507438-7753-43E0-B8FC-AC1667EBCBE1}">
               <a14:hiddenEffects xmlns:a14="http://schemas.microsoft.com/office/drawing/2010/main">
                 <a:effectLst>
                   <a:outerShdw blurRad="63500" dist="38099" dir="2700000" algn="ctr" rotWithShape="0">
@@ -17329,7 +17349,7 @@
           </a:ln>
           <a:effectLst/>
           <a:extLst>
-            <a:ext uri="{AF507438-7753-43e0-B8FC-AC1667EBCBE1}">
+            <a:ext uri="{AF507438-7753-43E0-B8FC-AC1667EBCBE1}">
               <a14:hiddenEffects xmlns:a14="http://schemas.microsoft.com/office/drawing/2010/main">
                 <a:effectLst>
                   <a:outerShdw blurRad="63500" dist="38099" dir="2700000" algn="ctr" rotWithShape="0">
@@ -17371,7 +17391,7 @@
           </a:ln>
           <a:effectLst/>
           <a:extLst>
-            <a:ext uri="{AF507438-7753-43e0-B8FC-AC1667EBCBE1}">
+            <a:ext uri="{AF507438-7753-43E0-B8FC-AC1667EBCBE1}">
               <a14:hiddenEffects xmlns:a14="http://schemas.microsoft.com/office/drawing/2010/main">
                 <a:effectLst>
                   <a:outerShdw blurRad="63500" dist="38099" dir="2700000" algn="ctr" rotWithShape="0">
@@ -17395,11 +17415,11 @@
   <p:clrMapOvr>
     <a:masterClrMapping/>
   </p:clrMapOvr>
-  <p:transition xmlns:p14="http://schemas.microsoft.com/office/powerpoint/2010/main"/>
+  <p:transition/>
   <p:timing>
     <p:tnLst>
       <p:par>
-        <p:cTn xmlns:p14="http://schemas.microsoft.com/office/powerpoint/2010/main" id="1" dur="indefinite" restart="never" nodeType="tmRoot">
+        <p:cTn id="1" dur="indefinite" restart="never" nodeType="tmRoot">
           <p:childTnLst>
             <p:seq concurrent="1" nextAc="seek">
               <p:cTn id="2" dur="indefinite" nodeType="mainSeq">
@@ -17821,7 +17841,7 @@
         </a:ln>
         <a:effectLst/>
         <a:extLst>
-          <a:ext uri="{AF507438-7753-43e0-B8FC-AC1667EBCBE1}">
+          <a:ext uri="{AF507438-7753-43E0-B8FC-AC1667EBCBE1}">
             <a14:hiddenEffects xmlns:a14="http://schemas.microsoft.com/office/drawing/2010/main">
               <a:effectLst>
                 <a:outerShdw blurRad="63500" dist="38099" dir="2700000" algn="ctr" rotWithShape="0">
@@ -17899,7 +17919,7 @@
         </a:ln>
         <a:effectLst/>
         <a:extLst>
-          <a:ext uri="{AF507438-7753-43e0-B8FC-AC1667EBCBE1}">
+          <a:ext uri="{AF507438-7753-43E0-B8FC-AC1667EBCBE1}">
             <a14:hiddenEffects xmlns:a14="http://schemas.microsoft.com/office/drawing/2010/main">
               <a:effectLst>
                 <a:outerShdw blurRad="63500" dist="38099" dir="2700000" algn="ctr" rotWithShape="0">
@@ -18241,7 +18261,7 @@
         </a:ln>
         <a:effectLst/>
         <a:extLst>
-          <a:ext uri="{AF507438-7753-43e0-B8FC-AC1667EBCBE1}">
+          <a:ext uri="{AF507438-7753-43E0-B8FC-AC1667EBCBE1}">
             <a14:hiddenEffects xmlns:a14="http://schemas.microsoft.com/office/drawing/2010/main">
               <a:effectLst>
                 <a:outerShdw blurRad="63500" dist="38099" dir="2700000" algn="ctr" rotWithShape="0">
@@ -18307,7 +18327,7 @@
         </a:ln>
         <a:effectLst/>
         <a:extLst>
-          <a:ext uri="{AF507438-7753-43e0-B8FC-AC1667EBCBE1}">
+          <a:ext uri="{AF507438-7753-43E0-B8FC-AC1667EBCBE1}">
             <a14:hiddenEffects xmlns:a14="http://schemas.microsoft.com/office/drawing/2010/main">
               <a:effectLst>
                 <a:outerShdw blurRad="63500" dist="38099" dir="2700000" algn="ctr" rotWithShape="0">

</xml_diff>